<commit_message>
Small changes made before/during lecture
</commit_message>
<xml_diff>
--- a/11-efficiency/lec.pptx
+++ b/11-efficiency/lec.pptx
@@ -246,7 +246,7 @@
           <a:p>
             <a:fld id="{5367F125-181F-9A48-A24E-AAD89CB055B5}" type="datetimeFigureOut">
               <a:rPr lang="en-US" smtClean="0"/>
-              <a:t>10/1/19</a:t>
+              <a:t>10/3/19</a:t>
             </a:fld>
             <a:endParaRPr lang="en-US"/>
           </a:p>
@@ -653,20 +653,6 @@
           <a:bodyPr/>
           <a:lstStyle/>
           <a:p>
-            <a:pPr lvl="0"/>
-            <a:r>
-              <a:rPr lang="en-US" dirty="0"/>
-              <a:t>Are those constants c1..c8 really useful?</a:t>
-            </a:r>
-          </a:p>
-          <a:p>
-            <a:pPr lvl="0"/>
-            <a:r>
-              <a:rPr lang="en-US" dirty="0"/>
-              <a:t>If it takes 25 steps in Java, but compiled down to RISC-V would take 10x more steps, is the precision useful?</a:t>
-            </a:r>
-          </a:p>
-          <a:p>
             <a:endParaRPr lang="en-US" dirty="0"/>
           </a:p>
         </p:txBody>
@@ -688,7 +674,7 @@
           <a:p>
             <a:fld id="{B7975FD5-AB21-4C45-BFE8-1D3F02B463E2}" type="slidenum">
               <a:rPr lang="en-US" smtClean="0"/>
-              <a:t>15</a:t>
+              <a:t>14</a:t>
             </a:fld>
             <a:endParaRPr lang="en-US"/>
           </a:p>
@@ -697,7 +683,7 @@
     </p:spTree>
     <p:extLst>
       <p:ext uri="{BB962C8B-B14F-4D97-AF65-F5344CB8AC3E}">
-        <p14:creationId xmlns:p14="http://schemas.microsoft.com/office/powerpoint/2010/main" val="747361105"/>
+        <p14:creationId xmlns:p14="http://schemas.microsoft.com/office/powerpoint/2010/main" val="1516480706"/>
       </p:ext>
     </p:extLst>
   </p:cSld>
@@ -751,6 +737,20 @@
           <a:bodyPr/>
           <a:lstStyle/>
           <a:p>
+            <a:pPr lvl="0"/>
+            <a:r>
+              <a:rPr lang="en-US" dirty="0"/>
+              <a:t>Are those constants c1..c8 really useful?</a:t>
+            </a:r>
+          </a:p>
+          <a:p>
+            <a:pPr lvl="0"/>
+            <a:r>
+              <a:rPr lang="en-US" dirty="0"/>
+              <a:t>If it takes 25 steps in Java, but compiled down to RISC-V would take 10x more steps, is the precision useful?</a:t>
+            </a:r>
+          </a:p>
+          <a:p>
             <a:endParaRPr lang="en-US" dirty="0"/>
           </a:p>
         </p:txBody>
@@ -772,7 +772,7 @@
           <a:p>
             <a:fld id="{B7975FD5-AB21-4C45-BFE8-1D3F02B463E2}" type="slidenum">
               <a:rPr lang="en-US" smtClean="0"/>
-              <a:t>19</a:t>
+              <a:t>15</a:t>
             </a:fld>
             <a:endParaRPr lang="en-US"/>
           </a:p>
@@ -781,7 +781,7 @@
     </p:spTree>
     <p:extLst>
       <p:ext uri="{BB962C8B-B14F-4D97-AF65-F5344CB8AC3E}">
-        <p14:creationId xmlns:p14="http://schemas.microsoft.com/office/powerpoint/2010/main" val="1594360694"/>
+        <p14:creationId xmlns:p14="http://schemas.microsoft.com/office/powerpoint/2010/main" val="747361105"/>
       </p:ext>
     </p:extLst>
   </p:cSld>
@@ -835,91 +835,8 @@
           <a:bodyPr/>
           <a:lstStyle/>
           <a:p>
-            <a:pPr marL="0" marR="0" lvl="0" indent="0" algn="l" defTabSz="457200" rtl="0" eaLnBrk="1" fontAlgn="auto" latinLnBrk="0" hangingPunct="1">
-              <a:lnSpc>
-                <a:spcPct val="100000"/>
-              </a:lnSpc>
-              <a:spcBef>
-                <a:spcPts val="0"/>
-              </a:spcBef>
-              <a:spcAft>
-                <a:spcPts val="0"/>
-              </a:spcAft>
-              <a:buClrTx/>
-              <a:buSzTx/>
-              <a:buFontTx/>
-              <a:buNone/>
-              <a:tabLst/>
-              <a:defRPr/>
-            </a:pPr>
-            <a:r>
-              <a:rPr lang="en-US" dirty="0"/>
-              <a:t>don't know which </a:t>
-            </a:r>
-            <a:r>
-              <a:rPr lang="en-US" dirty="0" err="1"/>
-              <a:t>int</a:t>
-            </a:r>
-            <a:r>
-              <a:rPr lang="en-US" dirty="0"/>
-              <a:t> when reasoning about the type of an expression</a:t>
-            </a:r>
-          </a:p>
-          <a:p>
-            <a:pPr marL="0" marR="0" lvl="0" indent="0" algn="l" defTabSz="457200" rtl="0" eaLnBrk="1" fontAlgn="auto" latinLnBrk="0" hangingPunct="1">
-              <a:lnSpc>
-                <a:spcPct val="100000"/>
-              </a:lnSpc>
-              <a:spcBef>
-                <a:spcPts val="0"/>
-              </a:spcBef>
-              <a:spcAft>
-                <a:spcPts val="0"/>
-              </a:spcAft>
-              <a:buClrTx/>
-              <a:buSzTx/>
-              <a:buFontTx/>
-              <a:buNone/>
-              <a:tabLst/>
-              <a:defRPr/>
-            </a:pPr>
-            <a:r>
-              <a:rPr lang="en-US" dirty="0"/>
-              <a:t>don't know whether positive or negative when manipulating it in a formula</a:t>
-            </a:r>
-          </a:p>
-          <a:p>
-            <a:pPr marL="0" marR="0" lvl="0" indent="0" algn="l" defTabSz="457200" rtl="0" eaLnBrk="1" fontAlgn="auto" latinLnBrk="0" hangingPunct="1">
-              <a:lnSpc>
-                <a:spcPct val="100000"/>
-              </a:lnSpc>
-              <a:spcBef>
-                <a:spcPts val="0"/>
-              </a:spcBef>
-              <a:spcAft>
-                <a:spcPts val="0"/>
-              </a:spcAft>
-              <a:buClrTx/>
-              <a:buSzTx/>
-              <a:buFontTx/>
-              <a:buNone/>
-              <a:tabLst/>
-              <a:defRPr/>
-            </a:pPr>
             <a:endParaRPr lang="en-US" dirty="0"/>
           </a:p>
-          <a:p>
-            <a:endParaRPr lang="en-US" dirty="0"/>
-          </a:p>
-          <a:p>
-            <a:endParaRPr lang="en-US" dirty="0"/>
-          </a:p>
-          <a:p>
-            <a:r>
-              <a:rPr lang="en-US" dirty="0"/>
-              <a:t>But before we do Big Oh, let’s do something simpler:  Big Ell</a:t>
-            </a:r>
-          </a:p>
         </p:txBody>
       </p:sp>
       <p:sp>
@@ -929,7 +846,7 @@
             <a:spLocks noGrp="1"/>
           </p:cNvSpPr>
           <p:nvPr>
-            <p:ph type="sldNum" sz="quarter" idx="10"/>
+            <p:ph type="sldNum" sz="quarter" idx="5"/>
           </p:nvPr>
         </p:nvSpPr>
         <p:spPr/>
@@ -939,7 +856,7 @@
           <a:p>
             <a:fld id="{B7975FD5-AB21-4C45-BFE8-1D3F02B463E2}" type="slidenum">
               <a:rPr lang="en-US" smtClean="0"/>
-              <a:t>20</a:t>
+              <a:t>19</a:t>
             </a:fld>
             <a:endParaRPr lang="en-US"/>
           </a:p>
@@ -948,7 +865,7 @@
     </p:spTree>
     <p:extLst>
       <p:ext uri="{BB962C8B-B14F-4D97-AF65-F5344CB8AC3E}">
-        <p14:creationId xmlns:p14="http://schemas.microsoft.com/office/powerpoint/2010/main" val="177849328"/>
+        <p14:creationId xmlns:p14="http://schemas.microsoft.com/office/powerpoint/2010/main" val="1594360694"/>
       </p:ext>
     </p:extLst>
   </p:cSld>
@@ -1002,8 +919,91 @@
           <a:bodyPr/>
           <a:lstStyle/>
           <a:p>
+            <a:pPr marL="0" marR="0" lvl="0" indent="0" algn="l" defTabSz="457200" rtl="0" eaLnBrk="1" fontAlgn="auto" latinLnBrk="0" hangingPunct="1">
+              <a:lnSpc>
+                <a:spcPct val="100000"/>
+              </a:lnSpc>
+              <a:spcBef>
+                <a:spcPts val="0"/>
+              </a:spcBef>
+              <a:spcAft>
+                <a:spcPts val="0"/>
+              </a:spcAft>
+              <a:buClrTx/>
+              <a:buSzTx/>
+              <a:buFontTx/>
+              <a:buNone/>
+              <a:tabLst/>
+              <a:defRPr/>
+            </a:pPr>
+            <a:r>
+              <a:rPr lang="en-US" dirty="0"/>
+              <a:t>don't know which </a:t>
+            </a:r>
+            <a:r>
+              <a:rPr lang="en-US" dirty="0" err="1"/>
+              <a:t>int</a:t>
+            </a:r>
+            <a:r>
+              <a:rPr lang="en-US" dirty="0"/>
+              <a:t> when reasoning about the type of an expression</a:t>
+            </a:r>
+          </a:p>
+          <a:p>
+            <a:pPr marL="0" marR="0" lvl="0" indent="0" algn="l" defTabSz="457200" rtl="0" eaLnBrk="1" fontAlgn="auto" latinLnBrk="0" hangingPunct="1">
+              <a:lnSpc>
+                <a:spcPct val="100000"/>
+              </a:lnSpc>
+              <a:spcBef>
+                <a:spcPts val="0"/>
+              </a:spcBef>
+              <a:spcAft>
+                <a:spcPts val="0"/>
+              </a:spcAft>
+              <a:buClrTx/>
+              <a:buSzTx/>
+              <a:buFontTx/>
+              <a:buNone/>
+              <a:tabLst/>
+              <a:defRPr/>
+            </a:pPr>
+            <a:r>
+              <a:rPr lang="en-US" dirty="0"/>
+              <a:t>don't know whether positive or negative when manipulating it in a formula</a:t>
+            </a:r>
+          </a:p>
+          <a:p>
+            <a:pPr marL="0" marR="0" lvl="0" indent="0" algn="l" defTabSz="457200" rtl="0" eaLnBrk="1" fontAlgn="auto" latinLnBrk="0" hangingPunct="1">
+              <a:lnSpc>
+                <a:spcPct val="100000"/>
+              </a:lnSpc>
+              <a:spcBef>
+                <a:spcPts val="0"/>
+              </a:spcBef>
+              <a:spcAft>
+                <a:spcPts val="0"/>
+              </a:spcAft>
+              <a:buClrTx/>
+              <a:buSzTx/>
+              <a:buFontTx/>
+              <a:buNone/>
+              <a:tabLst/>
+              <a:defRPr/>
+            </a:pPr>
             <a:endParaRPr lang="en-US" dirty="0"/>
           </a:p>
+          <a:p>
+            <a:endParaRPr lang="en-US" dirty="0"/>
+          </a:p>
+          <a:p>
+            <a:endParaRPr lang="en-US" dirty="0"/>
+          </a:p>
+          <a:p>
+            <a:r>
+              <a:rPr lang="en-US" dirty="0"/>
+              <a:t>But before we do Big Oh, let’s do something simpler:  Big Ell</a:t>
+            </a:r>
+          </a:p>
         </p:txBody>
       </p:sp>
       <p:sp>
@@ -1013,7 +1013,7 @@
             <a:spLocks noGrp="1"/>
           </p:cNvSpPr>
           <p:nvPr>
-            <p:ph type="sldNum" sz="quarter" idx="5"/>
+            <p:ph type="sldNum" sz="quarter" idx="10"/>
           </p:nvPr>
         </p:nvSpPr>
         <p:spPr/>
@@ -1023,7 +1023,7 @@
           <a:p>
             <a:fld id="{B7975FD5-AB21-4C45-BFE8-1D3F02B463E2}" type="slidenum">
               <a:rPr lang="en-US" smtClean="0"/>
-              <a:t>21</a:t>
+              <a:t>20</a:t>
             </a:fld>
             <a:endParaRPr lang="en-US"/>
           </a:p>
@@ -1032,7 +1032,7 @@
     </p:spTree>
     <p:extLst>
       <p:ext uri="{BB962C8B-B14F-4D97-AF65-F5344CB8AC3E}">
-        <p14:creationId xmlns:p14="http://schemas.microsoft.com/office/powerpoint/2010/main" val="3539602358"/>
+        <p14:creationId xmlns:p14="http://schemas.microsoft.com/office/powerpoint/2010/main" val="177849328"/>
       </p:ext>
     </p:extLst>
   </p:cSld>
@@ -1086,175 +1086,8 @@
           <a:bodyPr/>
           <a:lstStyle/>
           <a:p>
-            <a:r>
-              <a:rPr lang="en-US" dirty="0"/>
-              <a:t>Trick question!</a:t>
-            </a:r>
-          </a:p>
-          <a:p>
-            <a:pPr lvl="1"/>
-            <a:r>
-              <a:rPr lang="en-US" dirty="0"/>
-              <a:t>Replace L(5) with set:  1 + {0..5}</a:t>
-            </a:r>
-          </a:p>
-          <a:p>
-            <a:pPr lvl="1"/>
-            <a:r>
-              <a:rPr lang="en-US" dirty="0"/>
-              <a:t>But + is defined on </a:t>
-            </a:r>
-            <a:r>
-              <a:rPr lang="en-US" dirty="0" err="1"/>
-              <a:t>ints</a:t>
-            </a:r>
-            <a:r>
-              <a:rPr lang="en-US" dirty="0"/>
-              <a:t>, not sets of </a:t>
-            </a:r>
-            <a:r>
-              <a:rPr lang="en-US" dirty="0" err="1"/>
-              <a:t>ints</a:t>
-            </a:r>
             <a:endParaRPr lang="en-US" dirty="0"/>
           </a:p>
-          <a:p>
-            <a:r>
-              <a:rPr lang="en-US" dirty="0"/>
-              <a:t>We could distribute the + over the set: </a:t>
-            </a:r>
-            <a:br>
-              <a:rPr lang="en-US" dirty="0"/>
-            </a:br>
-            <a:r>
-              <a:rPr lang="en-US" dirty="0"/>
-              <a:t>{1+0, ..., 1+5} = {1..6}</a:t>
-            </a:r>
-          </a:p>
-          <a:p>
-            <a:pPr lvl="1"/>
-            <a:r>
-              <a:rPr lang="en-US" dirty="0"/>
-              <a:t>That is, a set of values, one for each possible instantiation of L(5)</a:t>
-            </a:r>
-          </a:p>
-          <a:p>
-            <a:r>
-              <a:rPr lang="en-US" dirty="0"/>
-              <a:t>Note that {1..6} ⊆ {0..6} = L(6)</a:t>
-            </a:r>
-          </a:p>
-          <a:p>
-            <a:r>
-              <a:rPr lang="en-US" dirty="0"/>
-              <a:t>So we could say that </a:t>
-            </a:r>
-            <a:r>
-              <a:rPr lang="en-US" dirty="0">
-                <a:solidFill>
-                  <a:srgbClr val="4F81BD"/>
-                </a:solidFill>
-              </a:rPr>
-              <a:t>1 + L(5) ⊆ L(6)</a:t>
-            </a:r>
-          </a:p>
-          <a:p>
-            <a:pPr marL="0" marR="0" lvl="0" indent="0" algn="l" defTabSz="457200" rtl="0" eaLnBrk="1" fontAlgn="auto" latinLnBrk="0" hangingPunct="1">
-              <a:lnSpc>
-                <a:spcPct val="100000"/>
-              </a:lnSpc>
-              <a:spcBef>
-                <a:spcPts val="0"/>
-              </a:spcBef>
-              <a:spcAft>
-                <a:spcPts val="0"/>
-              </a:spcAft>
-              <a:buClrTx/>
-              <a:buSzTx/>
-              <a:buFontTx/>
-              <a:buNone/>
-              <a:tabLst/>
-              <a:defRPr/>
-            </a:pPr>
-            <a:r>
-              <a:rPr lang="en-US" dirty="0"/>
-              <a:t>We could even say </a:t>
-            </a:r>
-            <a:r>
-              <a:rPr lang="en-US" dirty="0">
-                <a:solidFill>
-                  <a:srgbClr val="4F81BD"/>
-                </a:solidFill>
-              </a:rPr>
-              <a:t>1 + L(5) ⊆ L(7), which is accurate but not </a:t>
-            </a:r>
-            <a:r>
-              <a:rPr lang="en-US" i="1" dirty="0">
-                <a:solidFill>
-                  <a:srgbClr val="4F81BD"/>
-                </a:solidFill>
-              </a:rPr>
-              <a:t>tight</a:t>
-            </a:r>
-          </a:p>
-          <a:p>
-            <a:pPr marL="0" marR="0" lvl="0" indent="0" algn="l" defTabSz="457200" rtl="0" eaLnBrk="1" fontAlgn="auto" latinLnBrk="0" hangingPunct="1">
-              <a:lnSpc>
-                <a:spcPct val="100000"/>
-              </a:lnSpc>
-              <a:spcBef>
-                <a:spcPts val="0"/>
-              </a:spcBef>
-              <a:spcAft>
-                <a:spcPts val="0"/>
-              </a:spcAft>
-              <a:buClrTx/>
-              <a:buSzTx/>
-              <a:buFontTx/>
-              <a:buNone/>
-              <a:tabLst/>
-              <a:defRPr/>
-            </a:pPr>
-            <a:r>
-              <a:rPr lang="en-US" dirty="0"/>
-              <a:t>So might say that </a:t>
-            </a:r>
-            <a:r>
-              <a:rPr lang="en-US" dirty="0">
-                <a:solidFill>
-                  <a:srgbClr val="4F81BD"/>
-                </a:solidFill>
-              </a:rPr>
-              <a:t>1 + L(5) = L(6), but I deplore that notation</a:t>
-            </a:r>
-          </a:p>
-          <a:p>
-            <a:pPr marL="0" marR="0" lvl="0" indent="0" algn="l" defTabSz="457200" rtl="0" eaLnBrk="1" fontAlgn="auto" latinLnBrk="0" hangingPunct="1">
-              <a:lnSpc>
-                <a:spcPct val="100000"/>
-              </a:lnSpc>
-              <a:spcBef>
-                <a:spcPts val="0"/>
-              </a:spcBef>
-              <a:spcAft>
-                <a:spcPts val="0"/>
-              </a:spcAft>
-              <a:buClrTx/>
-              <a:buSzTx/>
-              <a:buFontTx/>
-              <a:buNone/>
-              <a:tabLst/>
-              <a:defRPr/>
-            </a:pPr>
-            <a:endParaRPr lang="en-US" i="1" dirty="0">
-              <a:solidFill>
-                <a:srgbClr val="4F81BD"/>
-              </a:solidFill>
-            </a:endParaRPr>
-          </a:p>
-          <a:p>
-            <a:endParaRPr lang="en-US" dirty="0"/>
-          </a:p>
         </p:txBody>
       </p:sp>
       <p:sp>
@@ -1264,7 +1097,7 @@
             <a:spLocks noGrp="1"/>
           </p:cNvSpPr>
           <p:nvPr>
-            <p:ph type="sldNum" sz="quarter" idx="10"/>
+            <p:ph type="sldNum" sz="quarter" idx="5"/>
           </p:nvPr>
         </p:nvSpPr>
         <p:spPr/>
@@ -1274,7 +1107,7 @@
           <a:p>
             <a:fld id="{B7975FD5-AB21-4C45-BFE8-1D3F02B463E2}" type="slidenum">
               <a:rPr lang="en-US" smtClean="0"/>
-              <a:t>23</a:t>
+              <a:t>21</a:t>
             </a:fld>
             <a:endParaRPr lang="en-US"/>
           </a:p>
@@ -1283,7 +1116,7 @@
     </p:spTree>
     <p:extLst>
       <p:ext uri="{BB962C8B-B14F-4D97-AF65-F5344CB8AC3E}">
-        <p14:creationId xmlns:p14="http://schemas.microsoft.com/office/powerpoint/2010/main" val="2838287282"/>
+        <p14:creationId xmlns:p14="http://schemas.microsoft.com/office/powerpoint/2010/main" val="3539602358"/>
       </p:ext>
     </p:extLst>
   </p:cSld>
@@ -1339,117 +1172,169 @@
           <a:p>
             <a:r>
               <a:rPr lang="en-US" dirty="0"/>
-              <a:t>L(3) = {0..3}</a:t>
-            </a:r>
-          </a:p>
-          <a:p>
-            <a:r>
-              <a:rPr lang="en-US" dirty="0"/>
-              <a:t>So 2</a:t>
-            </a:r>
-            <a:r>
-              <a:rPr lang="en-US" baseline="30000" dirty="0"/>
-              <a:t>L(3)</a:t>
-            </a:r>
-            <a:r>
-              <a:rPr lang="en-US" dirty="0"/>
-              <a:t> could be any of </a:t>
+              <a:t>Trick question!</a:t>
+            </a:r>
+          </a:p>
+          <a:p>
+            <a:pPr lvl="1"/>
+            <a:r>
+              <a:rPr lang="en-US" dirty="0"/>
+              <a:t>Replace L(5) with set:  1 + {0..5}</a:t>
+            </a:r>
+          </a:p>
+          <a:p>
+            <a:pPr lvl="1"/>
+            <a:r>
+              <a:rPr lang="en-US" dirty="0"/>
+              <a:t>But + is defined on </a:t>
+            </a:r>
+            <a:r>
+              <a:rPr lang="en-US" dirty="0" err="1"/>
+              <a:t>ints</a:t>
+            </a:r>
+            <a:r>
+              <a:rPr lang="en-US" dirty="0"/>
+              <a:t>, not sets of </a:t>
+            </a:r>
+            <a:r>
+              <a:rPr lang="en-US" dirty="0" err="1"/>
+              <a:t>ints</a:t>
+            </a:r>
+            <a:endParaRPr lang="en-US" dirty="0"/>
+          </a:p>
+          <a:p>
+            <a:r>
+              <a:rPr lang="en-US" dirty="0"/>
+              <a:t>We could distribute the + over the set: </a:t>
             </a:r>
             <a:br>
               <a:rPr lang="en-US" dirty="0"/>
             </a:br>
             <a:r>
               <a:rPr lang="en-US" dirty="0"/>
-              <a:t>{2</a:t>
-            </a:r>
-            <a:r>
-              <a:rPr lang="en-US" baseline="30000" dirty="0"/>
-              <a:t>0</a:t>
-            </a:r>
-            <a:r>
-              <a:rPr lang="en-US" dirty="0"/>
-              <a:t>, ... , 2</a:t>
-            </a:r>
-            <a:r>
-              <a:rPr lang="en-US" baseline="30000" dirty="0"/>
-              <a:t>3</a:t>
-            </a:r>
-            <a:r>
-              <a:rPr lang="en-US" dirty="0"/>
-              <a:t>} = {1, 2, 4, 8}</a:t>
-            </a:r>
-          </a:p>
-          <a:p>
-            <a:r>
-              <a:rPr lang="en-US" dirty="0"/>
-              <a:t>And {1,2,4,8} </a:t>
+              <a:t>{1+0, ..., 1+5} = {1..6}</a:t>
+            </a:r>
+          </a:p>
+          <a:p>
+            <a:pPr lvl="1"/>
+            <a:r>
+              <a:rPr lang="en-US" dirty="0"/>
+              <a:t>That is, a set of values, one for each possible instantiation of L(5)</a:t>
+            </a:r>
+          </a:p>
+          <a:p>
+            <a:r>
+              <a:rPr lang="en-US" dirty="0"/>
+              <a:t>Note that {1..6} ⊆ {0..6} = L(6)</a:t>
+            </a:r>
+          </a:p>
+          <a:p>
+            <a:r>
+              <a:rPr lang="en-US" dirty="0"/>
+              <a:t>So we could say that </a:t>
             </a:r>
             <a:r>
               <a:rPr lang="en-US" dirty="0">
                 <a:solidFill>
-                  <a:srgbClr val="000000"/>
+                  <a:srgbClr val="4F81BD"/>
                 </a:solidFill>
               </a:rPr>
-              <a:t>⊆ L(8) = L(2</a:t>
-            </a:r>
-            <a:r>
-              <a:rPr lang="en-US" baseline="30000" dirty="0">
+              <a:t>1 + L(5) ⊆ L(6)</a:t>
+            </a:r>
+          </a:p>
+          <a:p>
+            <a:pPr marL="0" marR="0" lvl="0" indent="0" algn="l" defTabSz="457200" rtl="0" eaLnBrk="1" fontAlgn="auto" latinLnBrk="0" hangingPunct="1">
+              <a:lnSpc>
+                <a:spcPct val="100000"/>
+              </a:lnSpc>
+              <a:spcBef>
+                <a:spcPts val="0"/>
+              </a:spcBef>
+              <a:spcAft>
+                <a:spcPts val="0"/>
+              </a:spcAft>
+              <a:buClrTx/>
+              <a:buSzTx/>
+              <a:buFontTx/>
+              <a:buNone/>
+              <a:tabLst/>
+              <a:defRPr/>
+            </a:pPr>
+            <a:r>
+              <a:rPr lang="en-US" dirty="0"/>
+              <a:t>We could even say </a:t>
+            </a:r>
+            <a:r>
+              <a:rPr lang="en-US" dirty="0">
                 <a:solidFill>
-                  <a:srgbClr val="000000"/>
+                  <a:srgbClr val="4F81BD"/>
                 </a:solidFill>
               </a:rPr>
-              <a:t>3</a:t>
+              <a:t>1 + L(5) ⊆ L(7), which is accurate but not </a:t>
+            </a:r>
+            <a:r>
+              <a:rPr lang="en-US" i="1" dirty="0">
+                <a:solidFill>
+                  <a:srgbClr val="4F81BD"/>
+                </a:solidFill>
+              </a:rPr>
+              <a:t>tight</a:t>
+            </a:r>
+          </a:p>
+          <a:p>
+            <a:pPr marL="0" marR="0" lvl="0" indent="0" algn="l" defTabSz="457200" rtl="0" eaLnBrk="1" fontAlgn="auto" latinLnBrk="0" hangingPunct="1">
+              <a:lnSpc>
+                <a:spcPct val="100000"/>
+              </a:lnSpc>
+              <a:spcBef>
+                <a:spcPts val="0"/>
+              </a:spcBef>
+              <a:spcAft>
+                <a:spcPts val="0"/>
+              </a:spcAft>
+              <a:buClrTx/>
+              <a:buSzTx/>
+              <a:buFontTx/>
+              <a:buNone/>
+              <a:tabLst/>
+              <a:defRPr/>
+            </a:pPr>
+            <a:r>
+              <a:rPr lang="en-US" dirty="0"/>
+              <a:t>So might say that </a:t>
             </a:r>
             <a:r>
               <a:rPr lang="en-US" dirty="0">
                 <a:solidFill>
-                  <a:srgbClr val="000000"/>
+                  <a:srgbClr val="4F81BD"/>
                 </a:solidFill>
               </a:rPr>
-              <a:t>)</a:t>
-            </a:r>
-          </a:p>
-          <a:p>
-            <a:r>
-              <a:rPr lang="en-US" dirty="0">
-                <a:solidFill>
-                  <a:srgbClr val="000000"/>
-                </a:solidFill>
-              </a:rPr>
-              <a:t>Therefore </a:t>
-            </a:r>
-            <a:r>
-              <a:rPr lang="en-US" dirty="0"/>
-              <a:t>2</a:t>
-            </a:r>
-            <a:r>
-              <a:rPr lang="en-US" baseline="30000" dirty="0"/>
-              <a:t>L(3)</a:t>
-            </a:r>
-            <a:r>
-              <a:rPr lang="en-US" dirty="0">
-                <a:solidFill>
-                  <a:srgbClr val="000000"/>
-                </a:solidFill>
-              </a:rPr>
-              <a:t> ⊆ L(2</a:t>
-            </a:r>
-            <a:r>
-              <a:rPr lang="en-US" baseline="30000" dirty="0">
-                <a:solidFill>
-                  <a:srgbClr val="000000"/>
-                </a:solidFill>
-              </a:rPr>
-              <a:t>3</a:t>
-            </a:r>
-            <a:r>
-              <a:rPr lang="en-US" dirty="0">
-                <a:solidFill>
-                  <a:srgbClr val="000000"/>
-                </a:solidFill>
-              </a:rPr>
-              <a:t>)</a:t>
-            </a:r>
+              <a:t>1 + L(5) = L(6), but I deplore that notation</a:t>
+            </a:r>
+          </a:p>
+          <a:p>
+            <a:pPr marL="0" marR="0" lvl="0" indent="0" algn="l" defTabSz="457200" rtl="0" eaLnBrk="1" fontAlgn="auto" latinLnBrk="0" hangingPunct="1">
+              <a:lnSpc>
+                <a:spcPct val="100000"/>
+              </a:lnSpc>
+              <a:spcBef>
+                <a:spcPts val="0"/>
+              </a:spcBef>
+              <a:spcAft>
+                <a:spcPts val="0"/>
+              </a:spcAft>
+              <a:buClrTx/>
+              <a:buSzTx/>
+              <a:buFontTx/>
+              <a:buNone/>
+              <a:tabLst/>
+              <a:defRPr/>
+            </a:pPr>
+            <a:endParaRPr lang="en-US" i="1" dirty="0">
+              <a:solidFill>
+                <a:srgbClr val="4F81BD"/>
+              </a:solidFill>
+            </a:endParaRPr>
           </a:p>
           <a:p>
             <a:endParaRPr lang="en-US" dirty="0"/>
@@ -1463,7 +1348,7 @@
             <a:spLocks noGrp="1"/>
           </p:cNvSpPr>
           <p:nvPr>
-            <p:ph type="sldNum" sz="quarter" idx="5"/>
+            <p:ph type="sldNum" sz="quarter" idx="10"/>
           </p:nvPr>
         </p:nvSpPr>
         <p:spPr/>
@@ -1473,7 +1358,7 @@
           <a:p>
             <a:fld id="{B7975FD5-AB21-4C45-BFE8-1D3F02B463E2}" type="slidenum">
               <a:rPr lang="en-US" smtClean="0"/>
-              <a:t>25</a:t>
+              <a:t>23</a:t>
             </a:fld>
             <a:endParaRPr lang="en-US"/>
           </a:p>
@@ -1482,7 +1367,7 @@
     </p:spTree>
     <p:extLst>
       <p:ext uri="{BB962C8B-B14F-4D97-AF65-F5344CB8AC3E}">
-        <p14:creationId xmlns:p14="http://schemas.microsoft.com/office/powerpoint/2010/main" val="1625635150"/>
+        <p14:creationId xmlns:p14="http://schemas.microsoft.com/office/powerpoint/2010/main" val="2838287282"/>
       </p:ext>
     </p:extLst>
   </p:cSld>
@@ -1538,21 +1423,116 @@
           <a:p>
             <a:r>
               <a:rPr lang="en-US" dirty="0"/>
-              <a:t>Why the naturals?  We're assuming function inputs and outputs are non-negative:</a:t>
-            </a:r>
-          </a:p>
-          <a:p>
-            <a:pPr marL="742950" lvl="2" indent="-342900"/>
-            <a:r>
-              <a:rPr lang="en-US" dirty="0"/>
-              <a:t>These are functions on input size and running time</a:t>
-            </a:r>
-          </a:p>
-          <a:p>
-            <a:pPr marL="742950" lvl="2" indent="-342900"/>
-            <a:r>
-              <a:rPr lang="en-US" dirty="0"/>
-              <a:t>Those won't be negative</a:t>
+              <a:t>L(3) = {0..3}</a:t>
+            </a:r>
+          </a:p>
+          <a:p>
+            <a:r>
+              <a:rPr lang="en-US" dirty="0"/>
+              <a:t>So 2</a:t>
+            </a:r>
+            <a:r>
+              <a:rPr lang="en-US" baseline="30000" dirty="0"/>
+              <a:t>L(3)</a:t>
+            </a:r>
+            <a:r>
+              <a:rPr lang="en-US" dirty="0"/>
+              <a:t> could be any of </a:t>
+            </a:r>
+            <a:br>
+              <a:rPr lang="en-US" dirty="0"/>
+            </a:br>
+            <a:r>
+              <a:rPr lang="en-US" dirty="0"/>
+              <a:t>{2</a:t>
+            </a:r>
+            <a:r>
+              <a:rPr lang="en-US" baseline="30000" dirty="0"/>
+              <a:t>0</a:t>
+            </a:r>
+            <a:r>
+              <a:rPr lang="en-US" dirty="0"/>
+              <a:t>, ... , 2</a:t>
+            </a:r>
+            <a:r>
+              <a:rPr lang="en-US" baseline="30000" dirty="0"/>
+              <a:t>3</a:t>
+            </a:r>
+            <a:r>
+              <a:rPr lang="en-US" dirty="0"/>
+              <a:t>} = {1, 2, 4, 8}</a:t>
+            </a:r>
+          </a:p>
+          <a:p>
+            <a:r>
+              <a:rPr lang="en-US" dirty="0"/>
+              <a:t>And {1,2,4,8} </a:t>
+            </a:r>
+            <a:r>
+              <a:rPr lang="en-US" dirty="0">
+                <a:solidFill>
+                  <a:srgbClr val="000000"/>
+                </a:solidFill>
+              </a:rPr>
+              <a:t>⊆ L(8) = L(2</a:t>
+            </a:r>
+            <a:r>
+              <a:rPr lang="en-US" baseline="30000" dirty="0">
+                <a:solidFill>
+                  <a:srgbClr val="000000"/>
+                </a:solidFill>
+              </a:rPr>
+              <a:t>3</a:t>
+            </a:r>
+            <a:r>
+              <a:rPr lang="en-US" dirty="0">
+                <a:solidFill>
+                  <a:srgbClr val="000000"/>
+                </a:solidFill>
+              </a:rPr>
+              <a:t>)</a:t>
+            </a:r>
+          </a:p>
+          <a:p>
+            <a:r>
+              <a:rPr lang="en-US" dirty="0">
+                <a:solidFill>
+                  <a:srgbClr val="000000"/>
+                </a:solidFill>
+              </a:rPr>
+              <a:t>Therefore </a:t>
+            </a:r>
+            <a:r>
+              <a:rPr lang="en-US" dirty="0"/>
+              <a:t>2</a:t>
+            </a:r>
+            <a:r>
+              <a:rPr lang="en-US" baseline="30000" dirty="0"/>
+              <a:t>L(3)</a:t>
+            </a:r>
+            <a:r>
+              <a:rPr lang="en-US" dirty="0">
+                <a:solidFill>
+                  <a:srgbClr val="000000"/>
+                </a:solidFill>
+              </a:rPr>
+              <a:t> ⊆ L(2</a:t>
+            </a:r>
+            <a:r>
+              <a:rPr lang="en-US" baseline="30000" dirty="0">
+                <a:solidFill>
+                  <a:srgbClr val="000000"/>
+                </a:solidFill>
+              </a:rPr>
+              <a:t>3</a:t>
+            </a:r>
+            <a:r>
+              <a:rPr lang="en-US" dirty="0">
+                <a:solidFill>
+                  <a:srgbClr val="000000"/>
+                </a:solidFill>
+              </a:rPr>
+              <a:t>)</a:t>
             </a:r>
           </a:p>
           <a:p>
@@ -1577,7 +1557,7 @@
           <a:p>
             <a:fld id="{B7975FD5-AB21-4C45-BFE8-1D3F02B463E2}" type="slidenum">
               <a:rPr lang="en-US" smtClean="0"/>
-              <a:t>27</a:t>
+              <a:t>25</a:t>
             </a:fld>
             <a:endParaRPr lang="en-US"/>
           </a:p>
@@ -1586,7 +1566,7 @@
     </p:spTree>
     <p:extLst>
       <p:ext uri="{BB962C8B-B14F-4D97-AF65-F5344CB8AC3E}">
-        <p14:creationId xmlns:p14="http://schemas.microsoft.com/office/powerpoint/2010/main" val="846191023"/>
+        <p14:creationId xmlns:p14="http://schemas.microsoft.com/office/powerpoint/2010/main" val="1625635150"/>
       </p:ext>
     </p:extLst>
   </p:cSld>
@@ -1640,6 +1620,26 @@
           <a:bodyPr/>
           <a:lstStyle/>
           <a:p>
+            <a:r>
+              <a:rPr lang="en-US" dirty="0"/>
+              <a:t>Why the naturals?  We're assuming function inputs and outputs are non-negative:</a:t>
+            </a:r>
+          </a:p>
+          <a:p>
+            <a:pPr marL="742950" lvl="2" indent="-342900"/>
+            <a:r>
+              <a:rPr lang="en-US" dirty="0"/>
+              <a:t>These are functions on input size and running time</a:t>
+            </a:r>
+          </a:p>
+          <a:p>
+            <a:pPr marL="742950" lvl="2" indent="-342900"/>
+            <a:r>
+              <a:rPr lang="en-US" dirty="0"/>
+              <a:t>Those won't be negative</a:t>
+            </a:r>
+          </a:p>
+          <a:p>
             <a:endParaRPr lang="en-US" dirty="0"/>
           </a:p>
         </p:txBody>
@@ -1651,7 +1651,7 @@
             <a:spLocks noGrp="1"/>
           </p:cNvSpPr>
           <p:nvPr>
-            <p:ph type="sldNum" sz="quarter" idx="10"/>
+            <p:ph type="sldNum" sz="quarter" idx="5"/>
           </p:nvPr>
         </p:nvSpPr>
         <p:spPr/>
@@ -1661,7 +1661,7 @@
           <a:p>
             <a:fld id="{B7975FD5-AB21-4C45-BFE8-1D3F02B463E2}" type="slidenum">
               <a:rPr lang="en-US" smtClean="0"/>
-              <a:t>30</a:t>
+              <a:t>27</a:t>
             </a:fld>
             <a:endParaRPr lang="en-US"/>
           </a:p>
@@ -1670,7 +1670,7 @@
     </p:spTree>
     <p:extLst>
       <p:ext uri="{BB962C8B-B14F-4D97-AF65-F5344CB8AC3E}">
-        <p14:creationId xmlns:p14="http://schemas.microsoft.com/office/powerpoint/2010/main" val="4171273243"/>
+        <p14:creationId xmlns:p14="http://schemas.microsoft.com/office/powerpoint/2010/main" val="846191023"/>
       </p:ext>
     </p:extLst>
   </p:cSld>
@@ -1724,29 +1724,6 @@
           <a:bodyPr/>
           <a:lstStyle/>
           <a:p>
-            <a:pPr marL="0" marR="0" lvl="0" indent="0" algn="l" defTabSz="457200" rtl="0" eaLnBrk="1" fontAlgn="auto" latinLnBrk="0" hangingPunct="1">
-              <a:lnSpc>
-                <a:spcPct val="100000"/>
-              </a:lnSpc>
-              <a:spcBef>
-                <a:spcPts val="0"/>
-              </a:spcBef>
-              <a:spcAft>
-                <a:spcPts val="0"/>
-              </a:spcAft>
-              <a:buClrTx/>
-              <a:buSzTx/>
-              <a:buFontTx/>
-              <a:buNone/>
-              <a:tabLst/>
-              <a:defRPr/>
-            </a:pPr>
-            <a:r>
-              <a:rPr lang="en-US" sz="1200" dirty="0"/>
-              <a:t>I have always found this abusage distressing...</a:t>
-            </a:r>
-          </a:p>
-          <a:p>
             <a:endParaRPr lang="en-US" dirty="0"/>
           </a:p>
         </p:txBody>
@@ -1758,7 +1735,7 @@
             <a:spLocks noGrp="1"/>
           </p:cNvSpPr>
           <p:nvPr>
-            <p:ph type="sldNum" sz="quarter" idx="5"/>
+            <p:ph type="sldNum" sz="quarter" idx="10"/>
           </p:nvPr>
         </p:nvSpPr>
         <p:spPr/>
@@ -1768,7 +1745,7 @@
           <a:p>
             <a:fld id="{B7975FD5-AB21-4C45-BFE8-1D3F02B463E2}" type="slidenum">
               <a:rPr lang="en-US" smtClean="0"/>
-              <a:t>36</a:t>
+              <a:t>30</a:t>
             </a:fld>
             <a:endParaRPr lang="en-US"/>
           </a:p>
@@ -1777,7 +1754,7 @@
     </p:spTree>
     <p:extLst>
       <p:ext uri="{BB962C8B-B14F-4D97-AF65-F5344CB8AC3E}">
-        <p14:creationId xmlns:p14="http://schemas.microsoft.com/office/powerpoint/2010/main" val="1089993137"/>
+        <p14:creationId xmlns:p14="http://schemas.microsoft.com/office/powerpoint/2010/main" val="4171273243"/>
       </p:ext>
     </p:extLst>
   </p:cSld>
@@ -1831,6 +1808,29 @@
           <a:bodyPr/>
           <a:lstStyle/>
           <a:p>
+            <a:pPr marL="0" marR="0" lvl="0" indent="0" algn="l" defTabSz="457200" rtl="0" eaLnBrk="1" fontAlgn="auto" latinLnBrk="0" hangingPunct="1">
+              <a:lnSpc>
+                <a:spcPct val="100000"/>
+              </a:lnSpc>
+              <a:spcBef>
+                <a:spcPts val="0"/>
+              </a:spcBef>
+              <a:spcAft>
+                <a:spcPts val="0"/>
+              </a:spcAft>
+              <a:buClrTx/>
+              <a:buSzTx/>
+              <a:buFontTx/>
+              <a:buNone/>
+              <a:tabLst/>
+              <a:defRPr/>
+            </a:pPr>
+            <a:r>
+              <a:rPr lang="en-US" sz="1200" dirty="0"/>
+              <a:t>I have always found this abusage distressing...</a:t>
+            </a:r>
+          </a:p>
+          <a:p>
             <a:endParaRPr lang="en-US" dirty="0"/>
           </a:p>
         </p:txBody>
@@ -1842,7 +1842,7 @@
             <a:spLocks noGrp="1"/>
           </p:cNvSpPr>
           <p:nvPr>
-            <p:ph type="sldNum" sz="quarter" idx="10"/>
+            <p:ph type="sldNum" sz="quarter" idx="5"/>
           </p:nvPr>
         </p:nvSpPr>
         <p:spPr/>
@@ -1852,7 +1852,7 @@
           <a:p>
             <a:fld id="{B7975FD5-AB21-4C45-BFE8-1D3F02B463E2}" type="slidenum">
               <a:rPr lang="en-US" smtClean="0"/>
-              <a:t>39</a:t>
+              <a:t>36</a:t>
             </a:fld>
             <a:endParaRPr lang="en-US"/>
           </a:p>
@@ -1861,7 +1861,7 @@
     </p:spTree>
     <p:extLst>
       <p:ext uri="{BB962C8B-B14F-4D97-AF65-F5344CB8AC3E}">
-        <p14:creationId xmlns:p14="http://schemas.microsoft.com/office/powerpoint/2010/main" val="2847625345"/>
+        <p14:creationId xmlns:p14="http://schemas.microsoft.com/office/powerpoint/2010/main" val="1089993137"/>
       </p:ext>
     </p:extLst>
   </p:cSld>
@@ -1946,6 +1946,90 @@
     <p:extLst>
       <p:ext uri="{BB962C8B-B14F-4D97-AF65-F5344CB8AC3E}">
         <p14:creationId xmlns:p14="http://schemas.microsoft.com/office/powerpoint/2010/main" val="3589894685"/>
+      </p:ext>
+    </p:extLst>
+  </p:cSld>
+  <p:clrMapOvr>
+    <a:masterClrMapping/>
+  </p:clrMapOvr>
+</p:notes>
+</file>
+
+<file path=ppt/notesSlides/notesSlide20.xml><?xml version="1.0" encoding="utf-8"?>
+<p:notes xmlns:a="http://schemas.openxmlformats.org/drawingml/2006/main" xmlns:r="http://schemas.openxmlformats.org/officeDocument/2006/relationships" xmlns:p="http://schemas.openxmlformats.org/presentationml/2006/main">
+  <p:cSld>
+    <p:spTree>
+      <p:nvGrpSpPr>
+        <p:cNvPr id="1" name=""/>
+        <p:cNvGrpSpPr/>
+        <p:nvPr/>
+      </p:nvGrpSpPr>
+      <p:grpSpPr>
+        <a:xfrm>
+          <a:off x="0" y="0"/>
+          <a:ext cx="0" cy="0"/>
+          <a:chOff x="0" y="0"/>
+          <a:chExt cx="0" cy="0"/>
+        </a:xfrm>
+      </p:grpSpPr>
+      <p:sp>
+        <p:nvSpPr>
+          <p:cNvPr id="2" name="Slide Image Placeholder 1"/>
+          <p:cNvSpPr>
+            <a:spLocks noGrp="1" noRot="1" noChangeAspect="1"/>
+          </p:cNvSpPr>
+          <p:nvPr>
+            <p:ph type="sldImg"/>
+          </p:nvPr>
+        </p:nvSpPr>
+        <p:spPr/>
+      </p:sp>
+      <p:sp>
+        <p:nvSpPr>
+          <p:cNvPr id="3" name="Notes Placeholder 2"/>
+          <p:cNvSpPr>
+            <a:spLocks noGrp="1"/>
+          </p:cNvSpPr>
+          <p:nvPr>
+            <p:ph type="body" idx="1"/>
+          </p:nvPr>
+        </p:nvSpPr>
+        <p:spPr/>
+        <p:txBody>
+          <a:bodyPr/>
+          <a:lstStyle/>
+          <a:p>
+            <a:endParaRPr lang="en-US" dirty="0"/>
+          </a:p>
+        </p:txBody>
+      </p:sp>
+      <p:sp>
+        <p:nvSpPr>
+          <p:cNvPr id="4" name="Slide Number Placeholder 3"/>
+          <p:cNvSpPr>
+            <a:spLocks noGrp="1"/>
+          </p:cNvSpPr>
+          <p:nvPr>
+            <p:ph type="sldNum" sz="quarter" idx="10"/>
+          </p:nvPr>
+        </p:nvSpPr>
+        <p:spPr/>
+        <p:txBody>
+          <a:bodyPr/>
+          <a:lstStyle/>
+          <a:p>
+            <a:fld id="{B7975FD5-AB21-4C45-BFE8-1D3F02B463E2}" type="slidenum">
+              <a:rPr lang="en-US" smtClean="0"/>
+              <a:t>39</a:t>
+            </a:fld>
+            <a:endParaRPr lang="en-US"/>
+          </a:p>
+        </p:txBody>
+      </p:sp>
+    </p:spTree>
+    <p:extLst>
+      <p:ext uri="{BB962C8B-B14F-4D97-AF65-F5344CB8AC3E}">
+        <p14:creationId xmlns:p14="http://schemas.microsoft.com/office/powerpoint/2010/main" val="2847625345"/>
       </p:ext>
     </p:extLst>
   </p:cSld>
@@ -2195,18 +2279,6 @@
             <a:endParaRPr lang="en-US" dirty="0"/>
           </a:p>
           <a:p>
-            <a:r>
-              <a:rPr lang="en-US" dirty="0"/>
-              <a:t>Steps are independent of implementation details</a:t>
-            </a:r>
-          </a:p>
-          <a:p>
-            <a:r>
-              <a:rPr lang="en-US" dirty="0"/>
-              <a:t>Could each step take a different amount of time?  Sure, but in practice, it doesn’t really matter</a:t>
-            </a:r>
-          </a:p>
-          <a:p>
             <a:endParaRPr lang="en-US" dirty="0"/>
           </a:p>
         </p:txBody>
@@ -2291,56 +2363,15 @@
           <a:bodyPr/>
           <a:lstStyle/>
           <a:p>
-            <a:pPr marL="0" marR="0" lvl="0" indent="0" algn="l" defTabSz="457200" rtl="0" eaLnBrk="1" fontAlgn="auto" latinLnBrk="0" hangingPunct="1">
-              <a:lnSpc>
-                <a:spcPct val="100000"/>
-              </a:lnSpc>
-              <a:spcBef>
-                <a:spcPts val="0"/>
-              </a:spcBef>
-              <a:spcAft>
-                <a:spcPts val="0"/>
-              </a:spcAft>
-              <a:buClrTx/>
-              <a:buSzTx/>
-              <a:buFontTx/>
-              <a:buNone/>
-              <a:tabLst/>
-              <a:defRPr/>
-            </a:pPr>
-            <a:r>
-              <a:rPr lang="en-US" dirty="0"/>
-              <a:t>Want a metric that can predict running time on </a:t>
-            </a:r>
-            <a:r>
-              <a:rPr lang="en-US" b="1" dirty="0"/>
-              <a:t>any</a:t>
-            </a:r>
-            <a:r>
-              <a:rPr lang="en-US" dirty="0"/>
-              <a:t> input instance</a:t>
-            </a:r>
-          </a:p>
-          <a:p>
-            <a:endParaRPr lang="en-US" dirty="0"/>
-          </a:p>
-          <a:p>
-            <a:r>
-              <a:rPr lang="en-US" dirty="0"/>
-              <a:t>But: particular inputs of the same size might really take a different amount of time?</a:t>
-            </a:r>
-          </a:p>
-          <a:p>
-            <a:pPr lvl="1"/>
-            <a:r>
-              <a:rPr lang="en-US" dirty="0"/>
-              <a:t>multiplying arbitrary matrices vs. multiplying by all zeros</a:t>
-            </a:r>
-          </a:p>
-          <a:p>
-            <a:r>
-              <a:rPr lang="en-US" dirty="0"/>
-              <a:t>in practice, size matters more</a:t>
+            <a:r>
+              <a:rPr lang="en-US" dirty="0"/>
+              <a:t>Steps are independent of implementation details</a:t>
+            </a:r>
+          </a:p>
+          <a:p>
+            <a:r>
+              <a:rPr lang="en-US" dirty="0"/>
+              <a:t>Could each step take a different amount of time?  Sure, but in practice, it doesn’t really matter</a:t>
             </a:r>
           </a:p>
           <a:p>
@@ -2365,7 +2396,7 @@
           <a:p>
             <a:fld id="{B7975FD5-AB21-4C45-BFE8-1D3F02B463E2}" type="slidenum">
               <a:rPr lang="en-US" smtClean="0"/>
-              <a:t>8</a:t>
+              <a:t>7</a:t>
             </a:fld>
             <a:endParaRPr lang="en-US"/>
           </a:p>
@@ -2374,7 +2405,7 @@
     </p:spTree>
     <p:extLst>
       <p:ext uri="{BB962C8B-B14F-4D97-AF65-F5344CB8AC3E}">
-        <p14:creationId xmlns:p14="http://schemas.microsoft.com/office/powerpoint/2010/main" val="2196377349"/>
+        <p14:creationId xmlns:p14="http://schemas.microsoft.com/office/powerpoint/2010/main" val="3642917751"/>
       </p:ext>
     </p:extLst>
   </p:cSld>
@@ -2446,75 +2477,38 @@
               <a:defRPr/>
             </a:pPr>
             <a:r>
-              <a:rPr lang="en-US" sz="1200" dirty="0"/>
-              <a:t>Want a metric that is reasonably objective; independent of subjective notions of what is fast</a:t>
+              <a:rPr lang="en-US" dirty="0"/>
+              <a:t>Want a metric that can predict running time on </a:t>
+            </a:r>
+            <a:r>
+              <a:rPr lang="en-US" b="1" dirty="0"/>
+              <a:t>any</a:t>
+            </a:r>
+            <a:r>
+              <a:rPr lang="en-US" dirty="0"/>
+              <a:t> input instance</a:t>
             </a:r>
           </a:p>
           <a:p>
             <a:endParaRPr lang="en-US" dirty="0"/>
           </a:p>
           <a:p>
-            <a:pPr lvl="0"/>
-            <a:r>
-              <a:rPr lang="en-US" sz="2400" i="1" dirty="0"/>
-              <a:t>brute force: </a:t>
-            </a:r>
-            <a:r>
-              <a:rPr lang="en-US" sz="2400" dirty="0"/>
-              <a:t>enumerate all the answers one by one, check and see whether the answer is right</a:t>
-            </a:r>
-          </a:p>
-          <a:p>
-            <a:pPr lvl="0"/>
-            <a:r>
-              <a:rPr lang="en-US" sz="2400" dirty="0"/>
-              <a:t>e.g., enumerate every possible permutation of a list, then check to see whether it’s a sorted version of input list, until you find one that is; you don’t really have to implement a sort that way!</a:t>
+            <a:r>
+              <a:rPr lang="en-US" dirty="0"/>
+              <a:t>But: particular inputs of the same size might really take a different amount of time?</a:t>
             </a:r>
           </a:p>
           <a:p>
             <a:pPr lvl="1"/>
-            <a:endParaRPr lang="en-US" sz="2000" dirty="0"/>
-          </a:p>
-          <a:p>
-            <a:pPr lvl="0"/>
-            <a:r>
-              <a:rPr lang="en-US" sz="2000" dirty="0"/>
-              <a:t>Brute force is the simple, dumb solution to nearly any algorithmic problem.  But requires enumeration of a huge space.</a:t>
-            </a:r>
-          </a:p>
-          <a:p>
-            <a:pPr lvl="0"/>
-            <a:endParaRPr lang="en-US" sz="2000" dirty="0"/>
-          </a:p>
-          <a:p>
-            <a:pPr lvl="0"/>
-            <a:r>
-              <a:rPr lang="en-US" sz="2000" dirty="0"/>
-              <a:t>related idea:  guess an answer, check whether correct; e.g., </a:t>
-            </a:r>
-            <a:r>
-              <a:rPr lang="en-US" sz="2000" dirty="0" err="1"/>
-              <a:t>bogosort</a:t>
-            </a:r>
-            <a:endParaRPr lang="en-US" sz="2000" dirty="0"/>
-          </a:p>
-          <a:p>
-            <a:pPr lvl="0"/>
-            <a:endParaRPr lang="en-US" sz="2000" dirty="0"/>
-          </a:p>
-          <a:p>
-            <a:pPr lvl="0"/>
-            <a:r>
-              <a:rPr lang="en-US" sz="2400" dirty="0"/>
-              <a:t>but </a:t>
-            </a:r>
-            <a:r>
-              <a:rPr lang="en-US" sz="2400" i="1" dirty="0"/>
-              <a:t>by how much </a:t>
-            </a:r>
-            <a:r>
-              <a:rPr lang="en-US" sz="2400" dirty="0"/>
-              <a:t>is enough to beat brute-force search?</a:t>
+            <a:r>
+              <a:rPr lang="en-US" dirty="0"/>
+              <a:t>multiplying arbitrary matrices vs. multiplying by all zeros</a:t>
+            </a:r>
+          </a:p>
+          <a:p>
+            <a:r>
+              <a:rPr lang="en-US" dirty="0"/>
+              <a:t>in practice, size matters more</a:t>
             </a:r>
           </a:p>
           <a:p>
@@ -2539,7 +2533,7 @@
           <a:p>
             <a:fld id="{B7975FD5-AB21-4C45-BFE8-1D3F02B463E2}" type="slidenum">
               <a:rPr lang="en-US" smtClean="0"/>
-              <a:t>10</a:t>
+              <a:t>8</a:t>
             </a:fld>
             <a:endParaRPr lang="en-US"/>
           </a:p>
@@ -2548,7 +2542,7 @@
     </p:spTree>
     <p:extLst>
       <p:ext uri="{BB962C8B-B14F-4D97-AF65-F5344CB8AC3E}">
-        <p14:creationId xmlns:p14="http://schemas.microsoft.com/office/powerpoint/2010/main" val="1298110504"/>
+        <p14:creationId xmlns:p14="http://schemas.microsoft.com/office/powerpoint/2010/main" val="2196377349"/>
       </p:ext>
     </p:extLst>
   </p:cSld>
@@ -2602,16 +2596,97 @@
           <a:bodyPr/>
           <a:lstStyle/>
           <a:p>
-            <a:r>
-              <a:rPr lang="en-US" dirty="0"/>
-              <a:t>Problems for which there are high-degree polynomial solutions eventually turn out to have low-degree solutions, in practice.</a:t>
-            </a:r>
-          </a:p>
-          <a:p>
-            <a:r>
-              <a:rPr lang="en-US" dirty="0"/>
-              <a:t>Problems for which there are only non-polynomial (but small) solutions turn out to be hard to solve anyway, in practice.</a:t>
-            </a:r>
+            <a:pPr marL="0" marR="0" lvl="0" indent="0" algn="l" defTabSz="457200" rtl="0" eaLnBrk="1" fontAlgn="auto" latinLnBrk="0" hangingPunct="1">
+              <a:lnSpc>
+                <a:spcPct val="100000"/>
+              </a:lnSpc>
+              <a:spcBef>
+                <a:spcPts val="0"/>
+              </a:spcBef>
+              <a:spcAft>
+                <a:spcPts val="0"/>
+              </a:spcAft>
+              <a:buClrTx/>
+              <a:buSzTx/>
+              <a:buFontTx/>
+              <a:buNone/>
+              <a:tabLst/>
+              <a:defRPr/>
+            </a:pPr>
+            <a:r>
+              <a:rPr lang="en-US" sz="1200" dirty="0"/>
+              <a:t>Want a metric that is reasonably objective; independent of subjective notions of what is fast</a:t>
+            </a:r>
+          </a:p>
+          <a:p>
+            <a:endParaRPr lang="en-US" dirty="0"/>
+          </a:p>
+          <a:p>
+            <a:pPr lvl="0"/>
+            <a:r>
+              <a:rPr lang="en-US" sz="2400" i="1" dirty="0"/>
+              <a:t>brute force: </a:t>
+            </a:r>
+            <a:r>
+              <a:rPr lang="en-US" sz="2400" dirty="0"/>
+              <a:t>enumerate all the answers one by one, check and see whether the answer is right</a:t>
+            </a:r>
+          </a:p>
+          <a:p>
+            <a:pPr lvl="0"/>
+            <a:r>
+              <a:rPr lang="en-US" sz="2400" dirty="0"/>
+              <a:t>e.g., enumerate every possible permutation of a list, then check to see whether it’s a sorted version of input list, until you find one that is; you don’t really have to implement a sort that way!</a:t>
+            </a:r>
+          </a:p>
+          <a:p>
+            <a:pPr lvl="1"/>
+            <a:endParaRPr lang="en-US" sz="2000" dirty="0"/>
+          </a:p>
+          <a:p>
+            <a:pPr lvl="0"/>
+            <a:r>
+              <a:rPr lang="en-US" sz="2000" dirty="0"/>
+              <a:t>Brute force is the simple, dumb solution to nearly any algorithmic problem.  But requires enumeration of a huge space.</a:t>
+            </a:r>
+          </a:p>
+          <a:p>
+            <a:pPr lvl="0"/>
+            <a:endParaRPr lang="en-US" sz="2000" dirty="0"/>
+          </a:p>
+          <a:p>
+            <a:pPr lvl="0"/>
+            <a:r>
+              <a:rPr lang="en-US" sz="2000" dirty="0"/>
+              <a:t>related idea:  guess an answer, check whether correct; e.g., </a:t>
+            </a:r>
+            <a:r>
+              <a:rPr lang="en-US" sz="2000" dirty="0" err="1"/>
+              <a:t>bogosort</a:t>
+            </a:r>
+            <a:endParaRPr lang="en-US" sz="2000" dirty="0"/>
+          </a:p>
+          <a:p>
+            <a:pPr lvl="0"/>
+            <a:endParaRPr lang="en-US" sz="2000" dirty="0"/>
+          </a:p>
+          <a:p>
+            <a:pPr lvl="0"/>
+            <a:r>
+              <a:rPr lang="en-US" sz="2400" dirty="0"/>
+              <a:t>but </a:t>
+            </a:r>
+            <a:r>
+              <a:rPr lang="en-US" sz="2400" i="1" dirty="0"/>
+              <a:t>by how much </a:t>
+            </a:r>
+            <a:r>
+              <a:rPr lang="en-US" sz="2400" dirty="0"/>
+              <a:t>is enough to beat brute-force search?</a:t>
+            </a:r>
+          </a:p>
+          <a:p>
+            <a:endParaRPr lang="en-US" dirty="0"/>
           </a:p>
         </p:txBody>
       </p:sp>
@@ -2632,7 +2707,7 @@
           <a:p>
             <a:fld id="{B7975FD5-AB21-4C45-BFE8-1D3F02B463E2}" type="slidenum">
               <a:rPr lang="en-US" smtClean="0"/>
-              <a:t>12</a:t>
+              <a:t>10</a:t>
             </a:fld>
             <a:endParaRPr lang="en-US"/>
           </a:p>
@@ -2641,7 +2716,7 @@
     </p:spTree>
     <p:extLst>
       <p:ext uri="{BB962C8B-B14F-4D97-AF65-F5344CB8AC3E}">
-        <p14:creationId xmlns:p14="http://schemas.microsoft.com/office/powerpoint/2010/main" val="1890626762"/>
+        <p14:creationId xmlns:p14="http://schemas.microsoft.com/office/powerpoint/2010/main" val="1298110504"/>
       </p:ext>
     </p:extLst>
   </p:cSld>
@@ -2697,13 +2772,13 @@
           <a:p>
             <a:r>
               <a:rPr lang="en-US" dirty="0"/>
-              <a:t>Why “maximum”?  Because now that we’re talking about input size instead of actual inputs, we have to talk about a range of number of steps.</a:t>
-            </a:r>
-          </a:p>
-          <a:p>
-            <a:r>
-              <a:rPr lang="en-US" dirty="0"/>
-              <a:t>Could consider minimum or average, too.  But right now we want to know how patient we have to be, so let’s restrict to maximum.</a:t>
+              <a:t>Problems for which there are high-degree polynomial solutions eventually turn out to have low-degree solutions, in practice.</a:t>
+            </a:r>
+          </a:p>
+          <a:p>
+            <a:r>
+              <a:rPr lang="en-US" dirty="0"/>
+              <a:t>Problems for which there are only non-polynomial (but small) solutions turn out to be hard to solve anyway, in practice.</a:t>
             </a:r>
           </a:p>
         </p:txBody>
@@ -2725,7 +2800,7 @@
           <a:p>
             <a:fld id="{B7975FD5-AB21-4C45-BFE8-1D3F02B463E2}" type="slidenum">
               <a:rPr lang="en-US" smtClean="0"/>
-              <a:t>13</a:t>
+              <a:t>12</a:t>
             </a:fld>
             <a:endParaRPr lang="en-US"/>
           </a:p>
@@ -2734,7 +2809,7 @@
     </p:spTree>
     <p:extLst>
       <p:ext uri="{BB962C8B-B14F-4D97-AF65-F5344CB8AC3E}">
-        <p14:creationId xmlns:p14="http://schemas.microsoft.com/office/powerpoint/2010/main" val="2334306936"/>
+        <p14:creationId xmlns:p14="http://schemas.microsoft.com/office/powerpoint/2010/main" val="1890626762"/>
       </p:ext>
     </p:extLst>
   </p:cSld>
@@ -2788,7 +2863,16 @@
           <a:bodyPr/>
           <a:lstStyle/>
           <a:p>
-            <a:endParaRPr lang="en-US" dirty="0"/>
+            <a:r>
+              <a:rPr lang="en-US" dirty="0"/>
+              <a:t>Why “maximum”?  Because now that we’re talking about input size instead of actual inputs, we have to talk about a range of number of steps.</a:t>
+            </a:r>
+          </a:p>
+          <a:p>
+            <a:r>
+              <a:rPr lang="en-US" dirty="0"/>
+              <a:t>Could consider minimum or average, too.  But right now we want to know how patient we have to be, so let’s restrict to maximum.</a:t>
+            </a:r>
           </a:p>
         </p:txBody>
       </p:sp>
@@ -2809,7 +2893,7 @@
           <a:p>
             <a:fld id="{B7975FD5-AB21-4C45-BFE8-1D3F02B463E2}" type="slidenum">
               <a:rPr lang="en-US" smtClean="0"/>
-              <a:t>14</a:t>
+              <a:t>13</a:t>
             </a:fld>
             <a:endParaRPr lang="en-US"/>
           </a:p>
@@ -2818,7 +2902,7 @@
     </p:spTree>
     <p:extLst>
       <p:ext uri="{BB962C8B-B14F-4D97-AF65-F5344CB8AC3E}">
-        <p14:creationId xmlns:p14="http://schemas.microsoft.com/office/powerpoint/2010/main" val="1516480706"/>
+        <p14:creationId xmlns:p14="http://schemas.microsoft.com/office/powerpoint/2010/main" val="2334306936"/>
       </p:ext>
     </p:extLst>
   </p:cSld>
@@ -2980,7 +3064,7 @@
           <a:p>
             <a:fld id="{96331252-4874-F047-84B8-3D3EF8743E79}" type="datetimeFigureOut">
               <a:rPr lang="en-US" smtClean="0"/>
-              <a:t>10/1/19</a:t>
+              <a:t>10/3/19</a:t>
             </a:fld>
             <a:endParaRPr lang="en-US"/>
           </a:p>
@@ -3247,7 +3331,7 @@
           <a:p>
             <a:fld id="{96331252-4874-F047-84B8-3D3EF8743E79}" type="datetimeFigureOut">
               <a:rPr lang="en-US" smtClean="0"/>
-              <a:t>10/1/19</a:t>
+              <a:t>10/3/19</a:t>
             </a:fld>
             <a:endParaRPr lang="en-US"/>
           </a:p>
@@ -3425,7 +3509,7 @@
           <a:p>
             <a:fld id="{96331252-4874-F047-84B8-3D3EF8743E79}" type="datetimeFigureOut">
               <a:rPr lang="en-US" smtClean="0"/>
-              <a:t>10/1/19</a:t>
+              <a:t>10/3/19</a:t>
             </a:fld>
             <a:endParaRPr lang="en-US"/>
           </a:p>
@@ -3593,7 +3677,7 @@
           <a:p>
             <a:fld id="{96331252-4874-F047-84B8-3D3EF8743E79}" type="datetimeFigureOut">
               <a:rPr lang="en-US" smtClean="0"/>
-              <a:t>10/1/19</a:t>
+              <a:t>10/3/19</a:t>
             </a:fld>
             <a:endParaRPr lang="en-US"/>
           </a:p>
@@ -3838,7 +3922,7 @@
           <a:p>
             <a:fld id="{96331252-4874-F047-84B8-3D3EF8743E79}" type="datetimeFigureOut">
               <a:rPr lang="en-US" smtClean="0"/>
-              <a:t>10/1/19</a:t>
+              <a:t>10/3/19</a:t>
             </a:fld>
             <a:endParaRPr lang="en-US"/>
           </a:p>
@@ -4123,7 +4207,7 @@
           <a:p>
             <a:fld id="{96331252-4874-F047-84B8-3D3EF8743E79}" type="datetimeFigureOut">
               <a:rPr lang="en-US" smtClean="0"/>
-              <a:t>10/1/19</a:t>
+              <a:t>10/3/19</a:t>
             </a:fld>
             <a:endParaRPr lang="en-US"/>
           </a:p>
@@ -4542,7 +4626,7 @@
           <a:p>
             <a:fld id="{96331252-4874-F047-84B8-3D3EF8743E79}" type="datetimeFigureOut">
               <a:rPr lang="en-US" smtClean="0"/>
-              <a:t>10/1/19</a:t>
+              <a:t>10/3/19</a:t>
             </a:fld>
             <a:endParaRPr lang="en-US"/>
           </a:p>
@@ -4659,7 +4743,7 @@
           <a:p>
             <a:fld id="{96331252-4874-F047-84B8-3D3EF8743E79}" type="datetimeFigureOut">
               <a:rPr lang="en-US" smtClean="0"/>
-              <a:t>10/1/19</a:t>
+              <a:t>10/3/19</a:t>
             </a:fld>
             <a:endParaRPr lang="en-US"/>
           </a:p>
@@ -4754,7 +4838,7 @@
           <a:p>
             <a:fld id="{96331252-4874-F047-84B8-3D3EF8743E79}" type="datetimeFigureOut">
               <a:rPr lang="en-US" smtClean="0"/>
-              <a:t>10/1/19</a:t>
+              <a:t>10/3/19</a:t>
             </a:fld>
             <a:endParaRPr lang="en-US"/>
           </a:p>
@@ -5029,7 +5113,7 @@
           <a:p>
             <a:fld id="{96331252-4874-F047-84B8-3D3EF8743E79}" type="datetimeFigureOut">
               <a:rPr lang="en-US" smtClean="0"/>
-              <a:t>10/1/19</a:t>
+              <a:t>10/3/19</a:t>
             </a:fld>
             <a:endParaRPr lang="en-US"/>
           </a:p>
@@ -5281,7 +5365,7 @@
           <a:p>
             <a:fld id="{96331252-4874-F047-84B8-3D3EF8743E79}" type="datetimeFigureOut">
               <a:rPr lang="en-US" smtClean="0"/>
-              <a:t>10/1/19</a:t>
+              <a:t>10/3/19</a:t>
             </a:fld>
             <a:endParaRPr lang="en-US"/>
           </a:p>
@@ -5495,7 +5579,7 @@
             <a:fld id="{96331252-4874-F047-84B8-3D3EF8743E79}" type="datetimeFigureOut">
               <a:rPr lang="en-US" smtClean="0"/>
               <a:pPr/>
-              <a:t>10/1/19</a:t>
+              <a:t>10/3/19</a:t>
             </a:fld>
             <a:endParaRPr lang="en-US"/>
           </a:p>
@@ -6258,7 +6342,7 @@
               <a:buNone/>
             </a:pPr>
             <a:r>
-              <a:rPr lang="en-US" b="1" dirty="0">
+              <a:rPr lang="en-US" sz="3600" b="1" dirty="0">
                 <a:solidFill>
                   <a:schemeClr val="accent3"/>
                 </a:solidFill>
@@ -6266,7 +6350,7 @@
               <a:t>Lesson 3:  </a:t>
             </a:r>
             <a:r>
-              <a:rPr lang="en-US" dirty="0">
+              <a:rPr lang="en-US" sz="3600" dirty="0">
                 <a:solidFill>
                   <a:schemeClr val="accent3"/>
                 </a:solidFill>
@@ -6278,7 +6362,7 @@
             <a:pPr marL="0" indent="0">
               <a:buNone/>
             </a:pPr>
-            <a:endParaRPr lang="en-US" b="1" dirty="0">
+            <a:endParaRPr lang="en-US" sz="3600" b="1" dirty="0">
               <a:solidFill>
                 <a:srgbClr val="4F81BD"/>
               </a:solidFill>
@@ -6289,7 +6373,7 @@
               <a:buNone/>
             </a:pPr>
             <a:r>
-              <a:rPr lang="en-US" b="1" dirty="0">
+              <a:rPr lang="en-US" sz="3600" b="1" dirty="0">
                 <a:solidFill>
                   <a:srgbClr val="4F81BD"/>
                 </a:solidFill>
@@ -6297,7 +6381,7 @@
               <a:t>Better idea:</a:t>
             </a:r>
             <a:r>
-              <a:rPr lang="en-US" dirty="0">
+              <a:rPr lang="en-US" sz="3600" dirty="0">
                 <a:solidFill>
                   <a:srgbClr val="4F81BD"/>
                 </a:solidFill>
@@ -6313,11 +6397,11 @@
               <a:rPr lang="en-US" dirty="0"/>
             </a:br>
             <a:r>
-              <a:rPr lang="en-US" dirty="0"/>
+              <a:rPr lang="en-US" sz="2800" dirty="0"/>
               <a:t>Number of steps is a polynomial function of the </a:t>
             </a:r>
             <a:r>
-              <a:rPr lang="en-US" dirty="0">
+              <a:rPr lang="en-US" sz="2800" dirty="0">
                 <a:solidFill>
                   <a:schemeClr val="accent3"/>
                 </a:solidFill>
@@ -6325,7 +6409,7 @@
               <a:t>input size</a:t>
             </a:r>
             <a:r>
-              <a:rPr lang="en-US" dirty="0"/>
+              <a:rPr lang="en-US" sz="2800" dirty="0"/>
               <a:t>:</a:t>
             </a:r>
           </a:p>
@@ -6334,11 +6418,11 @@
               <a:buNone/>
             </a:pPr>
             <a:r>
-              <a:rPr lang="en-US" dirty="0"/>
+              <a:rPr lang="en-US" sz="2800" dirty="0"/>
               <a:t>f(</a:t>
             </a:r>
             <a:r>
-              <a:rPr lang="en-US" dirty="0">
+              <a:rPr lang="en-US" sz="2800" dirty="0">
                 <a:solidFill>
                   <a:schemeClr val="accent3"/>
                 </a:solidFill>
@@ -6346,19 +6430,19 @@
               <a:t>x</a:t>
             </a:r>
             <a:r>
-              <a:rPr lang="en-US" dirty="0"/>
+              <a:rPr lang="en-US" sz="2800" dirty="0"/>
               <a:t>) = </a:t>
             </a:r>
             <a:r>
-              <a:rPr lang="en-US" dirty="0" err="1"/>
+              <a:rPr lang="en-US" sz="2800" dirty="0" err="1"/>
               <a:t>a</a:t>
             </a:r>
             <a:r>
-              <a:rPr lang="en-US" baseline="-25000" dirty="0" err="1"/>
+              <a:rPr lang="en-US" sz="2800" baseline="-25000" dirty="0" err="1"/>
               <a:t>n</a:t>
             </a:r>
             <a:r>
-              <a:rPr lang="en-US" dirty="0" err="1">
+              <a:rPr lang="en-US" sz="2800" dirty="0" err="1">
                 <a:solidFill>
                   <a:schemeClr val="accent3"/>
                 </a:solidFill>
@@ -6366,7 +6450,7 @@
               <a:t>x</a:t>
             </a:r>
             <a:r>
-              <a:rPr lang="en-US" baseline="30000" dirty="0" err="1">
+              <a:rPr lang="en-US" sz="2800" baseline="30000" dirty="0" err="1">
                 <a:solidFill>
                   <a:schemeClr val="accent3"/>
                 </a:solidFill>
@@ -6374,15 +6458,15 @@
               <a:t>n</a:t>
             </a:r>
             <a:r>
-              <a:rPr lang="en-US" dirty="0"/>
+              <a:rPr lang="en-US" sz="2800" dirty="0"/>
               <a:t> + a</a:t>
             </a:r>
             <a:r>
-              <a:rPr lang="en-US" baseline="-25000" dirty="0"/>
+              <a:rPr lang="en-US" sz="2800" baseline="-25000" dirty="0"/>
               <a:t>n-1</a:t>
             </a:r>
             <a:r>
-              <a:rPr lang="en-US" dirty="0">
+              <a:rPr lang="en-US" sz="2800" dirty="0">
                 <a:solidFill>
                   <a:schemeClr val="accent3"/>
                 </a:solidFill>
@@ -6390,7 +6474,7 @@
               <a:t>x</a:t>
             </a:r>
             <a:r>
-              <a:rPr lang="en-US" baseline="30000" dirty="0">
+              <a:rPr lang="en-US" sz="2800" baseline="30000" dirty="0">
                 <a:solidFill>
                   <a:schemeClr val="accent3"/>
                 </a:solidFill>
@@ -6398,19 +6482,19 @@
               <a:t>n-1</a:t>
             </a:r>
             <a:r>
-              <a:rPr lang="en-US" baseline="30000" dirty="0"/>
+              <a:rPr lang="en-US" sz="2800" baseline="30000" dirty="0"/>
               <a:t>  </a:t>
             </a:r>
             <a:r>
-              <a:rPr lang="en-US" dirty="0"/>
+              <a:rPr lang="en-US" sz="2800" dirty="0"/>
               <a:t>+ … + a</a:t>
             </a:r>
             <a:r>
-              <a:rPr lang="en-US" baseline="-25000" dirty="0"/>
+              <a:rPr lang="en-US" sz="2800" baseline="-25000" dirty="0"/>
               <a:t>2</a:t>
             </a:r>
             <a:r>
-              <a:rPr lang="en-US" dirty="0">
+              <a:rPr lang="en-US" sz="2800" dirty="0">
                 <a:solidFill>
                   <a:schemeClr val="accent3"/>
                 </a:solidFill>
@@ -6418,7 +6502,7 @@
               <a:t>x</a:t>
             </a:r>
             <a:r>
-              <a:rPr lang="en-US" baseline="30000" dirty="0">
+              <a:rPr lang="en-US" sz="2800" baseline="30000" dirty="0">
                 <a:solidFill>
                   <a:schemeClr val="accent3"/>
                 </a:solidFill>
@@ -6426,15 +6510,15 @@
               <a:t>2</a:t>
             </a:r>
             <a:r>
-              <a:rPr lang="en-US" dirty="0"/>
+              <a:rPr lang="en-US" sz="2800" dirty="0"/>
               <a:t> + a</a:t>
             </a:r>
             <a:r>
-              <a:rPr lang="en-US" baseline="-25000" dirty="0"/>
+              <a:rPr lang="en-US" sz="2800" baseline="-25000" dirty="0"/>
               <a:t>1</a:t>
             </a:r>
             <a:r>
-              <a:rPr lang="en-US" dirty="0">
+              <a:rPr lang="en-US" sz="2800" dirty="0">
                 <a:solidFill>
                   <a:schemeClr val="accent3"/>
                 </a:solidFill>
@@ -6442,11 +6526,11 @@
               <a:t>x</a:t>
             </a:r>
             <a:r>
-              <a:rPr lang="en-US" dirty="0"/>
+              <a:rPr lang="en-US" sz="2800" dirty="0"/>
               <a:t> + a</a:t>
             </a:r>
             <a:r>
-              <a:rPr lang="en-US" baseline="-25000" dirty="0"/>
+              <a:rPr lang="en-US" sz="2800" baseline="-25000" dirty="0"/>
               <a:t>0</a:t>
             </a:r>
           </a:p>
@@ -10236,7 +10320,7 @@
                                         <p:tgtEl>
                                           <p:spTgt spid="3">
                                             <p:txEl>
-                                              <p:pRg st="2" end="2"/>
+                                              <p:pRg st="1" end="1"/>
                                             </p:txEl>
                                           </p:spTgt>
                                         </p:tgtEl>
@@ -10278,6 +10362,55 @@
                                     <p:set>
                                       <p:cBhvr>
                                         <p:cTn id="10" dur="1" fill="hold">
+                                          <p:stCondLst>
+                                            <p:cond delay="0"/>
+                                          </p:stCondLst>
+                                        </p:cTn>
+                                        <p:tgtEl>
+                                          <p:spTgt spid="3">
+                                            <p:txEl>
+                                              <p:pRg st="2" end="2"/>
+                                            </p:txEl>
+                                          </p:spTgt>
+                                        </p:tgtEl>
+                                        <p:attrNameLst>
+                                          <p:attrName>style.visibility</p:attrName>
+                                        </p:attrNameLst>
+                                      </p:cBhvr>
+                                      <p:to>
+                                        <p:strVal val="visible"/>
+                                      </p:to>
+                                    </p:set>
+                                  </p:childTnLst>
+                                </p:cTn>
+                              </p:par>
+                            </p:childTnLst>
+                          </p:cTn>
+                        </p:par>
+                      </p:childTnLst>
+                    </p:cTn>
+                  </p:par>
+                  <p:par>
+                    <p:cTn id="11" fill="hold">
+                      <p:stCondLst>
+                        <p:cond delay="indefinite"/>
+                      </p:stCondLst>
+                      <p:childTnLst>
+                        <p:par>
+                          <p:cTn id="12" fill="hold">
+                            <p:stCondLst>
+                              <p:cond delay="0"/>
+                            </p:stCondLst>
+                            <p:childTnLst>
+                              <p:par>
+                                <p:cTn id="13" presetID="1" presetClass="entr" presetSubtype="0" fill="hold" nodeType="clickEffect">
+                                  <p:stCondLst>
+                                    <p:cond delay="0"/>
+                                  </p:stCondLst>
+                                  <p:childTnLst>
+                                    <p:set>
+                                      <p:cBhvr>
+                                        <p:cTn id="14" dur="1" fill="hold">
                                           <p:stCondLst>
                                             <p:cond delay="0"/>
                                           </p:stCondLst>

</xml_diff>